<commit_message>
Improvement to overview picture
</commit_message>
<xml_diff>
--- a/ContosoTradingReportGenerator/docs/ContosoTradingAggregator.pptx
+++ b/ContosoTradingReportGenerator/docs/ContosoTradingAggregator.pptx
@@ -7,6 +7,7 @@
   <p:sldIdLst>
     <p:sldId id="256" r:id="rId2"/>
     <p:sldId id="257" r:id="rId3"/>
+    <p:sldId id="258" r:id="rId4"/>
   </p:sldIdLst>
   <p:sldSz cx="12192000" cy="6858000"/>
   <p:notesSz cx="6858000" cy="9144000"/>
@@ -105,6 +106,11 @@
       </a:defRPr>
     </a:lvl9pPr>
   </p:defaultTextStyle>
+  <p:extLst>
+    <p:ext uri="{EFAFB233-063F-42B5-8137-9DF3F51BA10A}">
+      <p15:sldGuideLst xmlns:p15="http://schemas.microsoft.com/office/powerpoint/2012/main"/>
+    </p:ext>
+  </p:extLst>
 </p:presentation>
 </file>
 
@@ -257,7 +263,7 @@
           <a:p>
             <a:fld id="{12EB409C-3FA1-4E34-A9B8-0C86C96C5AE4}" type="datetimeFigureOut">
               <a:rPr lang="en-GB" smtClean="0"/>
-              <a:t>28/02/2022</a:t>
+              <a:t>04/03/2022</a:t>
             </a:fld>
             <a:endParaRPr lang="en-GB"/>
           </a:p>
@@ -457,7 +463,7 @@
           <a:p>
             <a:fld id="{12EB409C-3FA1-4E34-A9B8-0C86C96C5AE4}" type="datetimeFigureOut">
               <a:rPr lang="en-GB" smtClean="0"/>
-              <a:t>28/02/2022</a:t>
+              <a:t>04/03/2022</a:t>
             </a:fld>
             <a:endParaRPr lang="en-GB"/>
           </a:p>
@@ -667,7 +673,7 @@
           <a:p>
             <a:fld id="{12EB409C-3FA1-4E34-A9B8-0C86C96C5AE4}" type="datetimeFigureOut">
               <a:rPr lang="en-GB" smtClean="0"/>
-              <a:t>28/02/2022</a:t>
+              <a:t>04/03/2022</a:t>
             </a:fld>
             <a:endParaRPr lang="en-GB"/>
           </a:p>
@@ -867,7 +873,7 @@
           <a:p>
             <a:fld id="{12EB409C-3FA1-4E34-A9B8-0C86C96C5AE4}" type="datetimeFigureOut">
               <a:rPr lang="en-GB" smtClean="0"/>
-              <a:t>28/02/2022</a:t>
+              <a:t>04/03/2022</a:t>
             </a:fld>
             <a:endParaRPr lang="en-GB"/>
           </a:p>
@@ -1143,7 +1149,7 @@
           <a:p>
             <a:fld id="{12EB409C-3FA1-4E34-A9B8-0C86C96C5AE4}" type="datetimeFigureOut">
               <a:rPr lang="en-GB" smtClean="0"/>
-              <a:t>28/02/2022</a:t>
+              <a:t>04/03/2022</a:t>
             </a:fld>
             <a:endParaRPr lang="en-GB"/>
           </a:p>
@@ -1411,7 +1417,7 @@
           <a:p>
             <a:fld id="{12EB409C-3FA1-4E34-A9B8-0C86C96C5AE4}" type="datetimeFigureOut">
               <a:rPr lang="en-GB" smtClean="0"/>
-              <a:t>28/02/2022</a:t>
+              <a:t>04/03/2022</a:t>
             </a:fld>
             <a:endParaRPr lang="en-GB"/>
           </a:p>
@@ -1826,7 +1832,7 @@
           <a:p>
             <a:fld id="{12EB409C-3FA1-4E34-A9B8-0C86C96C5AE4}" type="datetimeFigureOut">
               <a:rPr lang="en-GB" smtClean="0"/>
-              <a:t>28/02/2022</a:t>
+              <a:t>04/03/2022</a:t>
             </a:fld>
             <a:endParaRPr lang="en-GB"/>
           </a:p>
@@ -1968,7 +1974,7 @@
           <a:p>
             <a:fld id="{12EB409C-3FA1-4E34-A9B8-0C86C96C5AE4}" type="datetimeFigureOut">
               <a:rPr lang="en-GB" smtClean="0"/>
-              <a:t>28/02/2022</a:t>
+              <a:t>04/03/2022</a:t>
             </a:fld>
             <a:endParaRPr lang="en-GB"/>
           </a:p>
@@ -2081,7 +2087,7 @@
           <a:p>
             <a:fld id="{12EB409C-3FA1-4E34-A9B8-0C86C96C5AE4}" type="datetimeFigureOut">
               <a:rPr lang="en-GB" smtClean="0"/>
-              <a:t>28/02/2022</a:t>
+              <a:t>04/03/2022</a:t>
             </a:fld>
             <a:endParaRPr lang="en-GB"/>
           </a:p>
@@ -2394,7 +2400,7 @@
           <a:p>
             <a:fld id="{12EB409C-3FA1-4E34-A9B8-0C86C96C5AE4}" type="datetimeFigureOut">
               <a:rPr lang="en-GB" smtClean="0"/>
-              <a:t>28/02/2022</a:t>
+              <a:t>04/03/2022</a:t>
             </a:fld>
             <a:endParaRPr lang="en-GB"/>
           </a:p>
@@ -2683,7 +2689,7 @@
           <a:p>
             <a:fld id="{12EB409C-3FA1-4E34-A9B8-0C86C96C5AE4}" type="datetimeFigureOut">
               <a:rPr lang="en-GB" smtClean="0"/>
-              <a:t>28/02/2022</a:t>
+              <a:t>04/03/2022</a:t>
             </a:fld>
             <a:endParaRPr lang="en-GB"/>
           </a:p>
@@ -2926,7 +2932,7 @@
           <a:p>
             <a:fld id="{12EB409C-3FA1-4E34-A9B8-0C86C96C5AE4}" type="datetimeFigureOut">
               <a:rPr lang="en-GB" smtClean="0"/>
-              <a:t>28/02/2022</a:t>
+              <a:t>04/03/2022</a:t>
             </a:fld>
             <a:endParaRPr lang="en-GB"/>
           </a:p>
@@ -4012,6 +4018,793 @@
 </p:sld>
 </file>
 
+<file path=ppt/slides/slide3.xml><?xml version="1.0" encoding="utf-8"?>
+<p:sld xmlns:a="http://schemas.openxmlformats.org/drawingml/2006/main" xmlns:r="http://schemas.openxmlformats.org/officeDocument/2006/relationships" xmlns:p="http://schemas.openxmlformats.org/presentationml/2006/main">
+  <p:cSld>
+    <p:spTree>
+      <p:nvGrpSpPr>
+        <p:cNvPr id="1" name=""/>
+        <p:cNvGrpSpPr/>
+        <p:nvPr/>
+      </p:nvGrpSpPr>
+      <p:grpSpPr>
+        <a:xfrm>
+          <a:off x="0" y="0"/>
+          <a:ext cx="0" cy="0"/>
+          <a:chOff x="0" y="0"/>
+          <a:chExt cx="0" cy="0"/>
+        </a:xfrm>
+      </p:grpSpPr>
+      <p:sp>
+        <p:nvSpPr>
+          <p:cNvPr id="2" name="Flowchart: Magnetic Disk 1">
+            <a:extLst>
+              <a:ext uri="{FF2B5EF4-FFF2-40B4-BE49-F238E27FC236}">
+                <a16:creationId xmlns:a16="http://schemas.microsoft.com/office/drawing/2014/main" id="{761FF625-BF19-4BB5-B274-ED6C4C9D1AD7}"/>
+              </a:ext>
+            </a:extLst>
+          </p:cNvPr>
+          <p:cNvSpPr/>
+          <p:nvPr/>
+        </p:nvSpPr>
+        <p:spPr>
+          <a:xfrm>
+            <a:off x="1585519" y="2223083"/>
+            <a:ext cx="1535185" cy="1082179"/>
+          </a:xfrm>
+          <a:prstGeom prst="flowChartMagneticDisk">
+            <a:avLst/>
+          </a:prstGeom>
+        </p:spPr>
+        <p:style>
+          <a:lnRef idx="2">
+            <a:schemeClr val="accent1">
+              <a:shade val="50000"/>
+            </a:schemeClr>
+          </a:lnRef>
+          <a:fillRef idx="1">
+            <a:schemeClr val="accent1"/>
+          </a:fillRef>
+          <a:effectRef idx="0">
+            <a:schemeClr val="accent1"/>
+          </a:effectRef>
+          <a:fontRef idx="minor">
+            <a:schemeClr val="lt1"/>
+          </a:fontRef>
+        </p:style>
+        <p:txBody>
+          <a:bodyPr rtlCol="0" anchor="ctr"/>
+          <a:lstStyle/>
+          <a:p>
+            <a:pPr algn="ctr"/>
+            <a:r>
+              <a:rPr lang="en-GB" dirty="0"/>
+              <a:t>Trading system</a:t>
+            </a:r>
+          </a:p>
+        </p:txBody>
+      </p:sp>
+      <p:sp>
+        <p:nvSpPr>
+          <p:cNvPr id="3" name="Flowchart: Magnetic Disk 2">
+            <a:extLst>
+              <a:ext uri="{FF2B5EF4-FFF2-40B4-BE49-F238E27FC236}">
+                <a16:creationId xmlns:a16="http://schemas.microsoft.com/office/drawing/2014/main" id="{D37A1649-5BB4-4076-A422-605DB6146EF9}"/>
+              </a:ext>
+            </a:extLst>
+          </p:cNvPr>
+          <p:cNvSpPr/>
+          <p:nvPr/>
+        </p:nvSpPr>
+        <p:spPr>
+          <a:xfrm>
+            <a:off x="8843394" y="2223082"/>
+            <a:ext cx="1535185" cy="1082179"/>
+          </a:xfrm>
+          <a:prstGeom prst="flowChartMagneticDisk">
+            <a:avLst/>
+          </a:prstGeom>
+        </p:spPr>
+        <p:style>
+          <a:lnRef idx="2">
+            <a:schemeClr val="accent4">
+              <a:shade val="50000"/>
+            </a:schemeClr>
+          </a:lnRef>
+          <a:fillRef idx="1">
+            <a:schemeClr val="accent4"/>
+          </a:fillRef>
+          <a:effectRef idx="0">
+            <a:schemeClr val="accent4"/>
+          </a:effectRef>
+          <a:fontRef idx="minor">
+            <a:schemeClr val="lt1"/>
+          </a:fontRef>
+        </p:style>
+        <p:txBody>
+          <a:bodyPr rtlCol="0" anchor="ctr"/>
+          <a:lstStyle/>
+          <a:p>
+            <a:pPr algn="ctr"/>
+            <a:r>
+              <a:rPr lang="en-GB" dirty="0"/>
+              <a:t>Reports repository</a:t>
+            </a:r>
+          </a:p>
+        </p:txBody>
+      </p:sp>
+      <p:graphicFrame>
+        <p:nvGraphicFramePr>
+          <p:cNvPr id="5" name="Table 5">
+            <a:extLst>
+              <a:ext uri="{FF2B5EF4-FFF2-40B4-BE49-F238E27FC236}">
+                <a16:creationId xmlns:a16="http://schemas.microsoft.com/office/drawing/2014/main" id="{9D14BB4D-83A7-4D7C-BD35-FE9AADA43945}"/>
+              </a:ext>
+            </a:extLst>
+          </p:cNvPr>
+          <p:cNvGraphicFramePr>
+            <a:graphicFrameLocks noGrp="1"/>
+          </p:cNvGraphicFramePr>
+          <p:nvPr>
+            <p:extLst>
+              <p:ext uri="{D42A27DB-BD31-4B8C-83A1-F6EECF244321}">
+                <p14:modId xmlns:p14="http://schemas.microsoft.com/office/powerpoint/2010/main" val="3674611386"/>
+              </p:ext>
+            </p:extLst>
+          </p:nvPr>
+        </p:nvGraphicFramePr>
+        <p:xfrm>
+          <a:off x="731707" y="3549275"/>
+          <a:ext cx="4133907" cy="1828800"/>
+        </p:xfrm>
+        <a:graphic>
+          <a:graphicData uri="http://schemas.openxmlformats.org/drawingml/2006/table">
+            <a:tbl>
+              <a:tblPr firstRow="1" bandRow="1">
+                <a:tableStyleId>{5C22544A-7EE6-4342-B048-85BDC9FD1C3A}</a:tableStyleId>
+              </a:tblPr>
+              <a:tblGrid>
+                <a:gridCol w="1377969">
+                  <a:extLst>
+                    <a:ext uri="{9D8B030D-6E8A-4147-A177-3AD203B41FA5}">
+                      <a16:colId xmlns:a16="http://schemas.microsoft.com/office/drawing/2014/main" val="3555993995"/>
+                    </a:ext>
+                  </a:extLst>
+                </a:gridCol>
+                <a:gridCol w="1377969">
+                  <a:extLst>
+                    <a:ext uri="{9D8B030D-6E8A-4147-A177-3AD203B41FA5}">
+                      <a16:colId xmlns:a16="http://schemas.microsoft.com/office/drawing/2014/main" val="1263947179"/>
+                    </a:ext>
+                  </a:extLst>
+                </a:gridCol>
+                <a:gridCol w="1377969">
+                  <a:extLst>
+                    <a:ext uri="{9D8B030D-6E8A-4147-A177-3AD203B41FA5}">
+                      <a16:colId xmlns:a16="http://schemas.microsoft.com/office/drawing/2014/main" val="2778176449"/>
+                    </a:ext>
+                  </a:extLst>
+                </a:gridCol>
+              </a:tblGrid>
+              <a:tr h="336155">
+                <a:tc>
+                  <a:txBody>
+                    <a:bodyPr/>
+                    <a:lstStyle/>
+                    <a:p>
+                      <a:r>
+                        <a:rPr lang="en-GB" dirty="0"/>
+                        <a:t>Date</a:t>
+                      </a:r>
+                    </a:p>
+                  </a:txBody>
+                  <a:tcPr/>
+                </a:tc>
+                <a:tc>
+                  <a:txBody>
+                    <a:bodyPr/>
+                    <a:lstStyle/>
+                    <a:p>
+                      <a:r>
+                        <a:rPr lang="en-GB" dirty="0"/>
+                        <a:t>Period</a:t>
+                      </a:r>
+                    </a:p>
+                  </a:txBody>
+                  <a:tcPr/>
+                </a:tc>
+                <a:tc>
+                  <a:txBody>
+                    <a:bodyPr/>
+                    <a:lstStyle/>
+                    <a:p>
+                      <a:r>
+                        <a:rPr lang="en-GB" dirty="0"/>
+                        <a:t>Volume</a:t>
+                      </a:r>
+                    </a:p>
+                  </a:txBody>
+                  <a:tcPr/>
+                </a:tc>
+                <a:extLst>
+                  <a:ext uri="{0D108BD9-81ED-4DB2-BD59-A6C34878D82A}">
+                    <a16:rowId xmlns:a16="http://schemas.microsoft.com/office/drawing/2014/main" val="4107653766"/>
+                  </a:ext>
+                </a:extLst>
+              </a:tr>
+              <a:tr h="336155">
+                <a:tc>
+                  <a:txBody>
+                    <a:bodyPr/>
+                    <a:lstStyle/>
+                    <a:p>
+                      <a:r>
+                        <a:rPr lang="en-GB" dirty="0"/>
+                        <a:t>01/04/2015</a:t>
+                      </a:r>
+                    </a:p>
+                  </a:txBody>
+                  <a:tcPr/>
+                </a:tc>
+                <a:tc>
+                  <a:txBody>
+                    <a:bodyPr/>
+                    <a:lstStyle/>
+                    <a:p>
+                      <a:r>
+                        <a:rPr lang="en-GB" dirty="0"/>
+                        <a:t>1</a:t>
+                      </a:r>
+                    </a:p>
+                  </a:txBody>
+                  <a:tcPr/>
+                </a:tc>
+                <a:tc>
+                  <a:txBody>
+                    <a:bodyPr/>
+                    <a:lstStyle/>
+                    <a:p>
+                      <a:r>
+                        <a:rPr lang="en-GB" dirty="0"/>
+                        <a:t>100</a:t>
+                      </a:r>
+                    </a:p>
+                  </a:txBody>
+                  <a:tcPr/>
+                </a:tc>
+                <a:extLst>
+                  <a:ext uri="{0D108BD9-81ED-4DB2-BD59-A6C34878D82A}">
+                    <a16:rowId xmlns:a16="http://schemas.microsoft.com/office/drawing/2014/main" val="2122806808"/>
+                  </a:ext>
+                </a:extLst>
+              </a:tr>
+              <a:tr h="336155">
+                <a:tc>
+                  <a:txBody>
+                    <a:bodyPr/>
+                    <a:lstStyle/>
+                    <a:p>
+                      <a:endParaRPr lang="en-GB"/>
+                    </a:p>
+                  </a:txBody>
+                  <a:tcPr/>
+                </a:tc>
+                <a:tc>
+                  <a:txBody>
+                    <a:bodyPr/>
+                    <a:lstStyle/>
+                    <a:p>
+                      <a:r>
+                        <a:rPr lang="en-GB" dirty="0"/>
+                        <a:t>2</a:t>
+                      </a:r>
+                    </a:p>
+                  </a:txBody>
+                  <a:tcPr/>
+                </a:tc>
+                <a:tc>
+                  <a:txBody>
+                    <a:bodyPr/>
+                    <a:lstStyle/>
+                    <a:p>
+                      <a:r>
+                        <a:rPr lang="en-GB" dirty="0"/>
+                        <a:t>100</a:t>
+                      </a:r>
+                    </a:p>
+                  </a:txBody>
+                  <a:tcPr/>
+                </a:tc>
+                <a:extLst>
+                  <a:ext uri="{0D108BD9-81ED-4DB2-BD59-A6C34878D82A}">
+                    <a16:rowId xmlns:a16="http://schemas.microsoft.com/office/drawing/2014/main" val="2434569124"/>
+                  </a:ext>
+                </a:extLst>
+              </a:tr>
+              <a:tr h="336155">
+                <a:tc>
+                  <a:txBody>
+                    <a:bodyPr/>
+                    <a:lstStyle/>
+                    <a:p>
+                      <a:r>
+                        <a:rPr lang="en-GB" dirty="0"/>
+                        <a:t>02/04/2015</a:t>
+                      </a:r>
+                    </a:p>
+                  </a:txBody>
+                  <a:tcPr/>
+                </a:tc>
+                <a:tc>
+                  <a:txBody>
+                    <a:bodyPr/>
+                    <a:lstStyle/>
+                    <a:p>
+                      <a:r>
+                        <a:rPr lang="en-GB" dirty="0"/>
+                        <a:t>1</a:t>
+                      </a:r>
+                    </a:p>
+                  </a:txBody>
+                  <a:tcPr/>
+                </a:tc>
+                <a:tc>
+                  <a:txBody>
+                    <a:bodyPr/>
+                    <a:lstStyle/>
+                    <a:p>
+                      <a:r>
+                        <a:rPr lang="en-GB" dirty="0"/>
+                        <a:t>120</a:t>
+                      </a:r>
+                    </a:p>
+                  </a:txBody>
+                  <a:tcPr/>
+                </a:tc>
+                <a:extLst>
+                  <a:ext uri="{0D108BD9-81ED-4DB2-BD59-A6C34878D82A}">
+                    <a16:rowId xmlns:a16="http://schemas.microsoft.com/office/drawing/2014/main" val="4063480728"/>
+                  </a:ext>
+                </a:extLst>
+              </a:tr>
+              <a:tr h="336155">
+                <a:tc>
+                  <a:txBody>
+                    <a:bodyPr/>
+                    <a:lstStyle/>
+                    <a:p>
+                      <a:endParaRPr lang="en-GB" dirty="0"/>
+                    </a:p>
+                  </a:txBody>
+                  <a:tcPr/>
+                </a:tc>
+                <a:tc>
+                  <a:txBody>
+                    <a:bodyPr/>
+                    <a:lstStyle/>
+                    <a:p>
+                      <a:r>
+                        <a:rPr lang="en-GB" dirty="0"/>
+                        <a:t>1</a:t>
+                      </a:r>
+                    </a:p>
+                  </a:txBody>
+                  <a:tcPr/>
+                </a:tc>
+                <a:tc>
+                  <a:txBody>
+                    <a:bodyPr/>
+                    <a:lstStyle/>
+                    <a:p>
+                      <a:r>
+                        <a:rPr lang="en-GB" dirty="0"/>
+                        <a:t>130</a:t>
+                      </a:r>
+                    </a:p>
+                  </a:txBody>
+                  <a:tcPr/>
+                </a:tc>
+                <a:extLst>
+                  <a:ext uri="{0D108BD9-81ED-4DB2-BD59-A6C34878D82A}">
+                    <a16:rowId xmlns:a16="http://schemas.microsoft.com/office/drawing/2014/main" val="2473088467"/>
+                  </a:ext>
+                </a:extLst>
+              </a:tr>
+            </a:tbl>
+          </a:graphicData>
+        </a:graphic>
+      </p:graphicFrame>
+      <p:graphicFrame>
+        <p:nvGraphicFramePr>
+          <p:cNvPr id="6" name="Table 6">
+            <a:extLst>
+              <a:ext uri="{FF2B5EF4-FFF2-40B4-BE49-F238E27FC236}">
+                <a16:creationId xmlns:a16="http://schemas.microsoft.com/office/drawing/2014/main" id="{52F3D02E-C9A5-4844-9567-6C87A95F6095}"/>
+              </a:ext>
+            </a:extLst>
+          </p:cNvPr>
+          <p:cNvGraphicFramePr>
+            <a:graphicFrameLocks noGrp="1"/>
+          </p:cNvGraphicFramePr>
+          <p:nvPr/>
+        </p:nvGraphicFramePr>
+        <p:xfrm>
+          <a:off x="6562053" y="3549275"/>
+          <a:ext cx="5400648" cy="1097280"/>
+        </p:xfrm>
+        <a:graphic>
+          <a:graphicData uri="http://schemas.openxmlformats.org/drawingml/2006/table">
+            <a:tbl>
+              <a:tblPr firstRow="1" bandRow="1">
+                <a:tableStyleId>{00A15C55-8517-42AA-B614-E9B94910E393}</a:tableStyleId>
+              </a:tblPr>
+              <a:tblGrid>
+                <a:gridCol w="1902439">
+                  <a:extLst>
+                    <a:ext uri="{9D8B030D-6E8A-4147-A177-3AD203B41FA5}">
+                      <a16:colId xmlns:a16="http://schemas.microsoft.com/office/drawing/2014/main" val="423234839"/>
+                    </a:ext>
+                  </a:extLst>
+                </a:gridCol>
+                <a:gridCol w="3498209">
+                  <a:extLst>
+                    <a:ext uri="{9D8B030D-6E8A-4147-A177-3AD203B41FA5}">
+                      <a16:colId xmlns:a16="http://schemas.microsoft.com/office/drawing/2014/main" val="453489715"/>
+                    </a:ext>
+                  </a:extLst>
+                </a:gridCol>
+              </a:tblGrid>
+              <a:tr h="253420">
+                <a:tc>
+                  <a:txBody>
+                    <a:bodyPr/>
+                    <a:lstStyle/>
+                    <a:p>
+                      <a:r>
+                        <a:rPr lang="en-GB" dirty="0"/>
+                        <a:t>Date</a:t>
+                      </a:r>
+                    </a:p>
+                  </a:txBody>
+                  <a:tcPr/>
+                </a:tc>
+                <a:tc>
+                  <a:txBody>
+                    <a:bodyPr/>
+                    <a:lstStyle/>
+                    <a:p>
+                      <a:pPr algn="ctr"/>
+                      <a:r>
+                        <a:rPr lang="en-GB" dirty="0" err="1"/>
+                        <a:t>FileName</a:t>
+                      </a:r>
+                      <a:endParaRPr lang="en-GB" dirty="0"/>
+                    </a:p>
+                  </a:txBody>
+                  <a:tcPr/>
+                </a:tc>
+                <a:extLst>
+                  <a:ext uri="{0D108BD9-81ED-4DB2-BD59-A6C34878D82A}">
+                    <a16:rowId xmlns:a16="http://schemas.microsoft.com/office/drawing/2014/main" val="619673047"/>
+                  </a:ext>
+                </a:extLst>
+              </a:tr>
+              <a:tr h="253420">
+                <a:tc>
+                  <a:txBody>
+                    <a:bodyPr/>
+                    <a:lstStyle/>
+                    <a:p>
+                      <a:r>
+                        <a:rPr lang="en-GB" dirty="0"/>
+                        <a:t>01/04/2015</a:t>
+                      </a:r>
+                    </a:p>
+                  </a:txBody>
+                  <a:tcPr/>
+                </a:tc>
+                <a:tc>
+                  <a:txBody>
+                    <a:bodyPr/>
+                    <a:lstStyle/>
+                    <a:p>
+                      <a:r>
+                        <a:rPr lang="en-GB" dirty="0"/>
+                        <a:t>PowerPosition_20150401_2300.csv</a:t>
+                      </a:r>
+                    </a:p>
+                  </a:txBody>
+                  <a:tcPr/>
+                </a:tc>
+                <a:extLst>
+                  <a:ext uri="{0D108BD9-81ED-4DB2-BD59-A6C34878D82A}">
+                    <a16:rowId xmlns:a16="http://schemas.microsoft.com/office/drawing/2014/main" val="2164394381"/>
+                  </a:ext>
+                </a:extLst>
+              </a:tr>
+              <a:tr h="253420">
+                <a:tc>
+                  <a:txBody>
+                    <a:bodyPr/>
+                    <a:lstStyle/>
+                    <a:p>
+                      <a:r>
+                        <a:rPr lang="en-GB" dirty="0"/>
+                        <a:t>02/04/2015</a:t>
+                      </a:r>
+                    </a:p>
+                  </a:txBody>
+                  <a:tcPr/>
+                </a:tc>
+                <a:tc>
+                  <a:txBody>
+                    <a:bodyPr/>
+                    <a:lstStyle/>
+                    <a:p>
+                      <a:r>
+                        <a:rPr lang="en-GB" dirty="0"/>
+                        <a:t>PowerPosition_20150402_2330.csv</a:t>
+                      </a:r>
+                    </a:p>
+                  </a:txBody>
+                  <a:tcPr/>
+                </a:tc>
+                <a:extLst>
+                  <a:ext uri="{0D108BD9-81ED-4DB2-BD59-A6C34878D82A}">
+                    <a16:rowId xmlns:a16="http://schemas.microsoft.com/office/drawing/2014/main" val="4047860269"/>
+                  </a:ext>
+                </a:extLst>
+              </a:tr>
+            </a:tbl>
+          </a:graphicData>
+        </a:graphic>
+      </p:graphicFrame>
+      <p:sp>
+        <p:nvSpPr>
+          <p:cNvPr id="7" name="Arrow: Right 6">
+            <a:extLst>
+              <a:ext uri="{FF2B5EF4-FFF2-40B4-BE49-F238E27FC236}">
+                <a16:creationId xmlns:a16="http://schemas.microsoft.com/office/drawing/2014/main" id="{63F4828C-EBC1-4B47-B4DB-6E5BE83F43D6}"/>
+              </a:ext>
+            </a:extLst>
+          </p:cNvPr>
+          <p:cNvSpPr/>
+          <p:nvPr/>
+        </p:nvSpPr>
+        <p:spPr>
+          <a:xfrm>
+            <a:off x="3649211" y="2420222"/>
+            <a:ext cx="1216403" cy="687898"/>
+          </a:xfrm>
+          <a:prstGeom prst="rightArrow">
+            <a:avLst/>
+          </a:prstGeom>
+        </p:spPr>
+        <p:style>
+          <a:lnRef idx="2">
+            <a:schemeClr val="accent1">
+              <a:shade val="50000"/>
+            </a:schemeClr>
+          </a:lnRef>
+          <a:fillRef idx="1">
+            <a:schemeClr val="accent1"/>
+          </a:fillRef>
+          <a:effectRef idx="0">
+            <a:schemeClr val="accent1"/>
+          </a:effectRef>
+          <a:fontRef idx="minor">
+            <a:schemeClr val="lt1"/>
+          </a:fontRef>
+        </p:style>
+        <p:txBody>
+          <a:bodyPr rtlCol="0" anchor="ctr"/>
+          <a:lstStyle/>
+          <a:p>
+            <a:pPr algn="ctr"/>
+            <a:endParaRPr lang="en-GB"/>
+          </a:p>
+        </p:txBody>
+      </p:sp>
+      <p:sp>
+        <p:nvSpPr>
+          <p:cNvPr id="8" name="Arrow: Right 7">
+            <a:extLst>
+              <a:ext uri="{FF2B5EF4-FFF2-40B4-BE49-F238E27FC236}">
+                <a16:creationId xmlns:a16="http://schemas.microsoft.com/office/drawing/2014/main" id="{E26DC123-0A90-48ED-96D4-CC69824823E1}"/>
+              </a:ext>
+            </a:extLst>
+          </p:cNvPr>
+          <p:cNvSpPr/>
+          <p:nvPr/>
+        </p:nvSpPr>
+        <p:spPr>
+          <a:xfrm>
+            <a:off x="6852410" y="2420222"/>
+            <a:ext cx="1216403" cy="687898"/>
+          </a:xfrm>
+          <a:prstGeom prst="rightArrow">
+            <a:avLst/>
+          </a:prstGeom>
+        </p:spPr>
+        <p:style>
+          <a:lnRef idx="2">
+            <a:schemeClr val="accent4">
+              <a:shade val="50000"/>
+            </a:schemeClr>
+          </a:lnRef>
+          <a:fillRef idx="1">
+            <a:schemeClr val="accent4"/>
+          </a:fillRef>
+          <a:effectRef idx="0">
+            <a:schemeClr val="accent4"/>
+          </a:effectRef>
+          <a:fontRef idx="minor">
+            <a:schemeClr val="lt1"/>
+          </a:fontRef>
+        </p:style>
+        <p:txBody>
+          <a:bodyPr rtlCol="0" anchor="ctr"/>
+          <a:lstStyle/>
+          <a:p>
+            <a:pPr algn="ctr"/>
+            <a:endParaRPr lang="en-GB"/>
+          </a:p>
+        </p:txBody>
+      </p:sp>
+      <p:sp>
+        <p:nvSpPr>
+          <p:cNvPr id="4" name="TextBox 3">
+            <a:extLst>
+              <a:ext uri="{FF2B5EF4-FFF2-40B4-BE49-F238E27FC236}">
+                <a16:creationId xmlns:a16="http://schemas.microsoft.com/office/drawing/2014/main" id="{26CF40BF-86DB-4E67-BBEB-CD20F5866806}"/>
+              </a:ext>
+            </a:extLst>
+          </p:cNvPr>
+          <p:cNvSpPr txBox="1"/>
+          <p:nvPr/>
+        </p:nvSpPr>
+        <p:spPr>
+          <a:xfrm>
+            <a:off x="5223546" y="2465982"/>
+            <a:ext cx="1148595" cy="646331"/>
+          </a:xfrm>
+          <a:prstGeom prst="rect">
+            <a:avLst/>
+          </a:prstGeom>
+          <a:noFill/>
+          <a:ln>
+            <a:solidFill>
+              <a:schemeClr val="tx1"/>
+            </a:solidFill>
+          </a:ln>
+        </p:spPr>
+        <p:txBody>
+          <a:bodyPr wrap="square" rtlCol="0">
+            <a:spAutoFit/>
+          </a:bodyPr>
+          <a:lstStyle/>
+          <a:p>
+            <a:pPr algn="ctr"/>
+            <a:r>
+              <a:rPr lang="en-GB" dirty="0"/>
+              <a:t>Data extraction</a:t>
+            </a:r>
+          </a:p>
+        </p:txBody>
+      </p:sp>
+      <p:sp>
+        <p:nvSpPr>
+          <p:cNvPr id="9" name="Rectangle 8">
+            <a:extLst>
+              <a:ext uri="{FF2B5EF4-FFF2-40B4-BE49-F238E27FC236}">
+                <a16:creationId xmlns:a16="http://schemas.microsoft.com/office/drawing/2014/main" id="{65970C10-54AC-4947-9335-6F48036D4600}"/>
+              </a:ext>
+            </a:extLst>
+          </p:cNvPr>
+          <p:cNvSpPr/>
+          <p:nvPr/>
+        </p:nvSpPr>
+        <p:spPr>
+          <a:xfrm>
+            <a:off x="83891" y="1526796"/>
+            <a:ext cx="5050172" cy="4127384"/>
+          </a:xfrm>
+          <a:prstGeom prst="rect">
+            <a:avLst/>
+          </a:prstGeom>
+          <a:noFill/>
+          <a:ln>
+            <a:prstDash val="dash"/>
+          </a:ln>
+        </p:spPr>
+        <p:style>
+          <a:lnRef idx="2">
+            <a:schemeClr val="accent1">
+              <a:shade val="50000"/>
+            </a:schemeClr>
+          </a:lnRef>
+          <a:fillRef idx="1">
+            <a:schemeClr val="accent1"/>
+          </a:fillRef>
+          <a:effectRef idx="0">
+            <a:schemeClr val="accent1"/>
+          </a:effectRef>
+          <a:fontRef idx="minor">
+            <a:schemeClr val="lt1"/>
+          </a:fontRef>
+        </p:style>
+        <p:txBody>
+          <a:bodyPr rtlCol="0" anchor="ctr"/>
+          <a:lstStyle/>
+          <a:p>
+            <a:pPr algn="ctr"/>
+            <a:endParaRPr lang="en-GB"/>
+          </a:p>
+        </p:txBody>
+      </p:sp>
+      <p:sp>
+        <p:nvSpPr>
+          <p:cNvPr id="10" name="Rectangle 9">
+            <a:extLst>
+              <a:ext uri="{FF2B5EF4-FFF2-40B4-BE49-F238E27FC236}">
+                <a16:creationId xmlns:a16="http://schemas.microsoft.com/office/drawing/2014/main" id="{857172E5-2B25-4835-9E2F-9547E1052D5E}"/>
+              </a:ext>
+            </a:extLst>
+          </p:cNvPr>
+          <p:cNvSpPr/>
+          <p:nvPr/>
+        </p:nvSpPr>
+        <p:spPr>
+          <a:xfrm>
+            <a:off x="6494478" y="1526796"/>
+            <a:ext cx="5560502" cy="4127384"/>
+          </a:xfrm>
+          <a:prstGeom prst="rect">
+            <a:avLst/>
+          </a:prstGeom>
+          <a:noFill/>
+          <a:ln>
+            <a:prstDash val="dash"/>
+          </a:ln>
+        </p:spPr>
+        <p:style>
+          <a:lnRef idx="2">
+            <a:schemeClr val="accent1">
+              <a:shade val="50000"/>
+            </a:schemeClr>
+          </a:lnRef>
+          <a:fillRef idx="1">
+            <a:schemeClr val="accent1"/>
+          </a:fillRef>
+          <a:effectRef idx="0">
+            <a:schemeClr val="accent1"/>
+          </a:effectRef>
+          <a:fontRef idx="minor">
+            <a:schemeClr val="lt1"/>
+          </a:fontRef>
+        </p:style>
+        <p:txBody>
+          <a:bodyPr rtlCol="0" anchor="ctr"/>
+          <a:lstStyle/>
+          <a:p>
+            <a:pPr algn="ctr"/>
+            <a:endParaRPr lang="en-GB"/>
+          </a:p>
+        </p:txBody>
+      </p:sp>
+    </p:spTree>
+    <p:extLst>
+      <p:ext uri="{BB962C8B-B14F-4D97-AF65-F5344CB8AC3E}">
+        <p14:creationId xmlns:p14="http://schemas.microsoft.com/office/powerpoint/2010/main" val="3892744420"/>
+      </p:ext>
+    </p:extLst>
+  </p:cSld>
+  <p:clrMapOvr>
+    <a:masterClrMapping/>
+  </p:clrMapOvr>
+</p:sld>
+</file>
+
 <file path=ppt/theme/theme1.xml><?xml version="1.0" encoding="utf-8"?>
 <a:theme xmlns:a="http://schemas.openxmlformats.org/drawingml/2006/main" name="Office Theme">
   <a:themeElements>

</xml_diff>

<commit_message>
csv generation,  moved settings further down
</commit_message>
<xml_diff>
--- a/ContosoTradingReportGenerator/docs/ContosoTradingAggregator.pptx
+++ b/ContosoTradingReportGenerator/docs/ContosoTradingAggregator.pptx
@@ -8,6 +8,7 @@
     <p:sldId id="256" r:id="rId2"/>
     <p:sldId id="257" r:id="rId3"/>
     <p:sldId id="258" r:id="rId4"/>
+    <p:sldId id="259" r:id="rId5"/>
   </p:sldIdLst>
   <p:sldSz cx="12192000" cy="6858000"/>
   <p:notesSz cx="6858000" cy="9144000"/>
@@ -4805,6 +4806,1030 @@
 </p:sld>
 </file>
 
+<file path=ppt/slides/slide4.xml><?xml version="1.0" encoding="utf-8"?>
+<p:sld xmlns:a="http://schemas.openxmlformats.org/drawingml/2006/main" xmlns:r="http://schemas.openxmlformats.org/officeDocument/2006/relationships" xmlns:p="http://schemas.openxmlformats.org/presentationml/2006/main">
+  <p:cSld>
+    <p:spTree>
+      <p:nvGrpSpPr>
+        <p:cNvPr id="1" name=""/>
+        <p:cNvGrpSpPr/>
+        <p:nvPr/>
+      </p:nvGrpSpPr>
+      <p:grpSpPr>
+        <a:xfrm>
+          <a:off x="0" y="0"/>
+          <a:ext cx="0" cy="0"/>
+          <a:chOff x="0" y="0"/>
+          <a:chExt cx="0" cy="0"/>
+        </a:xfrm>
+      </p:grpSpPr>
+      <p:sp>
+        <p:nvSpPr>
+          <p:cNvPr id="2" name="Flowchart: Terminator 1">
+            <a:extLst>
+              <a:ext uri="{FF2B5EF4-FFF2-40B4-BE49-F238E27FC236}">
+                <a16:creationId xmlns:a16="http://schemas.microsoft.com/office/drawing/2014/main" id="{71150647-CFE9-42E7-AB49-A5643EAF981C}"/>
+              </a:ext>
+            </a:extLst>
+          </p:cNvPr>
+          <p:cNvSpPr/>
+          <p:nvPr/>
+        </p:nvSpPr>
+        <p:spPr>
+          <a:xfrm>
+            <a:off x="520117" y="813732"/>
+            <a:ext cx="1937857" cy="494951"/>
+          </a:xfrm>
+          <a:prstGeom prst="flowChartTerminator">
+            <a:avLst/>
+          </a:prstGeom>
+          <a:solidFill>
+            <a:srgbClr val="FFC000"/>
+          </a:solidFill>
+          <a:ln>
+            <a:solidFill>
+              <a:schemeClr val="tx1"/>
+            </a:solidFill>
+          </a:ln>
+        </p:spPr>
+        <p:style>
+          <a:lnRef idx="2">
+            <a:schemeClr val="accent1">
+              <a:shade val="50000"/>
+            </a:schemeClr>
+          </a:lnRef>
+          <a:fillRef idx="1">
+            <a:schemeClr val="accent1"/>
+          </a:fillRef>
+          <a:effectRef idx="0">
+            <a:schemeClr val="accent1"/>
+          </a:effectRef>
+          <a:fontRef idx="minor">
+            <a:schemeClr val="lt1"/>
+          </a:fontRef>
+        </p:style>
+        <p:txBody>
+          <a:bodyPr rtlCol="0" anchor="ctr"/>
+          <a:lstStyle/>
+          <a:p>
+            <a:pPr algn="ctr"/>
+            <a:r>
+              <a:rPr lang="en-GB" dirty="0">
+                <a:solidFill>
+                  <a:srgbClr val="FF0000"/>
+                </a:solidFill>
+              </a:rPr>
+              <a:t>Start</a:t>
+            </a:r>
+          </a:p>
+        </p:txBody>
+      </p:sp>
+      <p:sp>
+        <p:nvSpPr>
+          <p:cNvPr id="3" name="Flowchart: Process 2">
+            <a:extLst>
+              <a:ext uri="{FF2B5EF4-FFF2-40B4-BE49-F238E27FC236}">
+                <a16:creationId xmlns:a16="http://schemas.microsoft.com/office/drawing/2014/main" id="{A1E56EBA-8AAD-422A-9BA6-3222F8767B84}"/>
+              </a:ext>
+            </a:extLst>
+          </p:cNvPr>
+          <p:cNvSpPr/>
+          <p:nvPr/>
+        </p:nvSpPr>
+        <p:spPr>
+          <a:xfrm>
+            <a:off x="3187817" y="813732"/>
+            <a:ext cx="2860646" cy="494951"/>
+          </a:xfrm>
+          <a:prstGeom prst="flowChartProcess">
+            <a:avLst/>
+          </a:prstGeom>
+        </p:spPr>
+        <p:style>
+          <a:lnRef idx="2">
+            <a:schemeClr val="accent1">
+              <a:shade val="50000"/>
+            </a:schemeClr>
+          </a:lnRef>
+          <a:fillRef idx="1">
+            <a:schemeClr val="accent1"/>
+          </a:fillRef>
+          <a:effectRef idx="0">
+            <a:schemeClr val="accent1"/>
+          </a:effectRef>
+          <a:fontRef idx="minor">
+            <a:schemeClr val="lt1"/>
+          </a:fontRef>
+        </p:style>
+        <p:txBody>
+          <a:bodyPr rtlCol="0" anchor="ctr"/>
+          <a:lstStyle/>
+          <a:p>
+            <a:pPr algn="ctr"/>
+            <a:r>
+              <a:rPr lang="en-GB" dirty="0"/>
+              <a:t>Daemon wakes up</a:t>
+            </a:r>
+          </a:p>
+        </p:txBody>
+      </p:sp>
+      <p:sp>
+        <p:nvSpPr>
+          <p:cNvPr id="4" name="Flowchart: Process 3">
+            <a:extLst>
+              <a:ext uri="{FF2B5EF4-FFF2-40B4-BE49-F238E27FC236}">
+                <a16:creationId xmlns:a16="http://schemas.microsoft.com/office/drawing/2014/main" id="{5E72A3AA-0633-4DD7-96C2-37268ABAA7E6}"/>
+              </a:ext>
+            </a:extLst>
+          </p:cNvPr>
+          <p:cNvSpPr/>
+          <p:nvPr/>
+        </p:nvSpPr>
+        <p:spPr>
+          <a:xfrm>
+            <a:off x="7667537" y="813732"/>
+            <a:ext cx="2860646" cy="494951"/>
+          </a:xfrm>
+          <a:prstGeom prst="flowChartProcess">
+            <a:avLst/>
+          </a:prstGeom>
+        </p:spPr>
+        <p:style>
+          <a:lnRef idx="2">
+            <a:schemeClr val="accent1">
+              <a:shade val="50000"/>
+            </a:schemeClr>
+          </a:lnRef>
+          <a:fillRef idx="1">
+            <a:schemeClr val="accent1"/>
+          </a:fillRef>
+          <a:effectRef idx="0">
+            <a:schemeClr val="accent1"/>
+          </a:effectRef>
+          <a:fontRef idx="minor">
+            <a:schemeClr val="lt1"/>
+          </a:fontRef>
+        </p:style>
+        <p:txBody>
+          <a:bodyPr rtlCol="0" anchor="ctr"/>
+          <a:lstStyle/>
+          <a:p>
+            <a:pPr algn="ctr"/>
+            <a:r>
+              <a:rPr lang="en-GB" dirty="0"/>
+              <a:t>Poll the reports repository for latest report</a:t>
+            </a:r>
+          </a:p>
+        </p:txBody>
+      </p:sp>
+      <p:sp>
+        <p:nvSpPr>
+          <p:cNvPr id="5" name="Arrow: Right 4">
+            <a:extLst>
+              <a:ext uri="{FF2B5EF4-FFF2-40B4-BE49-F238E27FC236}">
+                <a16:creationId xmlns:a16="http://schemas.microsoft.com/office/drawing/2014/main" id="{49DB4828-CFAC-4B90-98F0-A7CE62D03F2D}"/>
+              </a:ext>
+            </a:extLst>
+          </p:cNvPr>
+          <p:cNvSpPr/>
+          <p:nvPr/>
+        </p:nvSpPr>
+        <p:spPr>
+          <a:xfrm>
+            <a:off x="6599340" y="956345"/>
+            <a:ext cx="422246" cy="276837"/>
+          </a:xfrm>
+          <a:prstGeom prst="rightArrow">
+            <a:avLst/>
+          </a:prstGeom>
+        </p:spPr>
+        <p:style>
+          <a:lnRef idx="2">
+            <a:schemeClr val="accent1">
+              <a:shade val="50000"/>
+            </a:schemeClr>
+          </a:lnRef>
+          <a:fillRef idx="1">
+            <a:schemeClr val="accent1"/>
+          </a:fillRef>
+          <a:effectRef idx="0">
+            <a:schemeClr val="accent1"/>
+          </a:effectRef>
+          <a:fontRef idx="minor">
+            <a:schemeClr val="lt1"/>
+          </a:fontRef>
+        </p:style>
+        <p:txBody>
+          <a:bodyPr rtlCol="0" anchor="ctr"/>
+          <a:lstStyle/>
+          <a:p>
+            <a:pPr algn="ctr"/>
+            <a:endParaRPr lang="en-GB"/>
+          </a:p>
+        </p:txBody>
+      </p:sp>
+      <p:sp>
+        <p:nvSpPr>
+          <p:cNvPr id="6" name="Arrow: Right 5">
+            <a:extLst>
+              <a:ext uri="{FF2B5EF4-FFF2-40B4-BE49-F238E27FC236}">
+                <a16:creationId xmlns:a16="http://schemas.microsoft.com/office/drawing/2014/main" id="{1E63532A-6183-4427-B9B8-EA0F8BCBC1BE}"/>
+              </a:ext>
+            </a:extLst>
+          </p:cNvPr>
+          <p:cNvSpPr/>
+          <p:nvPr/>
+        </p:nvSpPr>
+        <p:spPr>
+          <a:xfrm>
+            <a:off x="2539068" y="953548"/>
+            <a:ext cx="422246" cy="276837"/>
+          </a:xfrm>
+          <a:prstGeom prst="rightArrow">
+            <a:avLst/>
+          </a:prstGeom>
+        </p:spPr>
+        <p:style>
+          <a:lnRef idx="2">
+            <a:schemeClr val="accent1">
+              <a:shade val="50000"/>
+            </a:schemeClr>
+          </a:lnRef>
+          <a:fillRef idx="1">
+            <a:schemeClr val="accent1"/>
+          </a:fillRef>
+          <a:effectRef idx="0">
+            <a:schemeClr val="accent1"/>
+          </a:effectRef>
+          <a:fontRef idx="minor">
+            <a:schemeClr val="lt1"/>
+          </a:fontRef>
+        </p:style>
+        <p:txBody>
+          <a:bodyPr rtlCol="0" anchor="ctr"/>
+          <a:lstStyle/>
+          <a:p>
+            <a:pPr algn="ctr"/>
+            <a:endParaRPr lang="en-GB"/>
+          </a:p>
+        </p:txBody>
+      </p:sp>
+      <p:sp>
+        <p:nvSpPr>
+          <p:cNvPr id="7" name="Flowchart: Process 6">
+            <a:extLst>
+              <a:ext uri="{FF2B5EF4-FFF2-40B4-BE49-F238E27FC236}">
+                <a16:creationId xmlns:a16="http://schemas.microsoft.com/office/drawing/2014/main" id="{C6676E76-BE8B-456B-936F-48BC872AF4B9}"/>
+              </a:ext>
+            </a:extLst>
+          </p:cNvPr>
+          <p:cNvSpPr/>
+          <p:nvPr/>
+        </p:nvSpPr>
+        <p:spPr>
+          <a:xfrm>
+            <a:off x="8096776" y="5601793"/>
+            <a:ext cx="2431407" cy="494951"/>
+          </a:xfrm>
+          <a:prstGeom prst="flowChartProcess">
+            <a:avLst/>
+          </a:prstGeom>
+        </p:spPr>
+        <p:style>
+          <a:lnRef idx="2">
+            <a:schemeClr val="accent1">
+              <a:shade val="50000"/>
+            </a:schemeClr>
+          </a:lnRef>
+          <a:fillRef idx="1">
+            <a:schemeClr val="accent1"/>
+          </a:fillRef>
+          <a:effectRef idx="0">
+            <a:schemeClr val="accent1"/>
+          </a:effectRef>
+          <a:fontRef idx="minor">
+            <a:schemeClr val="lt1"/>
+          </a:fontRef>
+        </p:style>
+        <p:txBody>
+          <a:bodyPr rtlCol="0" anchor="ctr"/>
+          <a:lstStyle/>
+          <a:p>
+            <a:pPr algn="ctr"/>
+            <a:r>
+              <a:rPr lang="en-GB" dirty="0"/>
+              <a:t>Find backlog </a:t>
+            </a:r>
+          </a:p>
+          <a:p>
+            <a:pPr algn="ctr"/>
+            <a:r>
+              <a:rPr lang="en-GB" dirty="0"/>
+              <a:t>of reports</a:t>
+            </a:r>
+          </a:p>
+        </p:txBody>
+      </p:sp>
+      <p:sp>
+        <p:nvSpPr>
+          <p:cNvPr id="8" name="Flowchart: Process 7">
+            <a:extLst>
+              <a:ext uri="{FF2B5EF4-FFF2-40B4-BE49-F238E27FC236}">
+                <a16:creationId xmlns:a16="http://schemas.microsoft.com/office/drawing/2014/main" id="{C8DADAAA-A498-4BA4-8CF3-9054A8A0BF0C}"/>
+              </a:ext>
+            </a:extLst>
+          </p:cNvPr>
+          <p:cNvSpPr/>
+          <p:nvPr/>
+        </p:nvSpPr>
+        <p:spPr>
+          <a:xfrm>
+            <a:off x="330138" y="5559844"/>
+            <a:ext cx="2130803" cy="850287"/>
+          </a:xfrm>
+          <a:prstGeom prst="flowChartProcess">
+            <a:avLst/>
+          </a:prstGeom>
+        </p:spPr>
+        <p:style>
+          <a:lnRef idx="2">
+            <a:schemeClr val="accent1">
+              <a:shade val="50000"/>
+            </a:schemeClr>
+          </a:lnRef>
+          <a:fillRef idx="1">
+            <a:schemeClr val="accent1"/>
+          </a:fillRef>
+          <a:effectRef idx="0">
+            <a:schemeClr val="accent1"/>
+          </a:effectRef>
+          <a:fontRef idx="minor">
+            <a:schemeClr val="lt1"/>
+          </a:fontRef>
+        </p:style>
+        <p:txBody>
+          <a:bodyPr rtlCol="0" anchor="ctr"/>
+          <a:lstStyle/>
+          <a:p>
+            <a:pPr algn="ctr"/>
+            <a:r>
+              <a:rPr lang="en-GB" dirty="0"/>
+              <a:t>Query trades and generate earliest </a:t>
+            </a:r>
+          </a:p>
+          <a:p>
+            <a:pPr algn="ctr"/>
+            <a:r>
+              <a:rPr lang="en-GB" dirty="0"/>
+              <a:t>backlog</a:t>
+            </a:r>
+          </a:p>
+        </p:txBody>
+      </p:sp>
+      <p:sp>
+        <p:nvSpPr>
+          <p:cNvPr id="9" name="Arrow: Up 8">
+            <a:extLst>
+              <a:ext uri="{FF2B5EF4-FFF2-40B4-BE49-F238E27FC236}">
+                <a16:creationId xmlns:a16="http://schemas.microsoft.com/office/drawing/2014/main" id="{7E825D5E-954F-45C4-985F-901973C94708}"/>
+              </a:ext>
+            </a:extLst>
+          </p:cNvPr>
+          <p:cNvSpPr/>
+          <p:nvPr/>
+        </p:nvSpPr>
+        <p:spPr>
+          <a:xfrm>
+            <a:off x="5349379" y="3294775"/>
+            <a:ext cx="453006" cy="1283371"/>
+          </a:xfrm>
+          <a:prstGeom prst="upArrow">
+            <a:avLst/>
+          </a:prstGeom>
+        </p:spPr>
+        <p:style>
+          <a:lnRef idx="2">
+            <a:schemeClr val="accent1">
+              <a:shade val="50000"/>
+            </a:schemeClr>
+          </a:lnRef>
+          <a:fillRef idx="1">
+            <a:schemeClr val="accent1"/>
+          </a:fillRef>
+          <a:effectRef idx="0">
+            <a:schemeClr val="accent1"/>
+          </a:effectRef>
+          <a:fontRef idx="minor">
+            <a:schemeClr val="lt1"/>
+          </a:fontRef>
+        </p:style>
+        <p:txBody>
+          <a:bodyPr rtlCol="0" anchor="ctr"/>
+          <a:lstStyle/>
+          <a:p>
+            <a:pPr algn="ctr"/>
+            <a:endParaRPr lang="en-GB" dirty="0"/>
+          </a:p>
+        </p:txBody>
+      </p:sp>
+      <p:sp>
+        <p:nvSpPr>
+          <p:cNvPr id="11" name="Flowchart: Decision 10">
+            <a:extLst>
+              <a:ext uri="{FF2B5EF4-FFF2-40B4-BE49-F238E27FC236}">
+                <a16:creationId xmlns:a16="http://schemas.microsoft.com/office/drawing/2014/main" id="{B95D5FA8-117C-4C47-ADFE-92B15E1BC4B5}"/>
+              </a:ext>
+            </a:extLst>
+          </p:cNvPr>
+          <p:cNvSpPr/>
+          <p:nvPr/>
+        </p:nvSpPr>
+        <p:spPr>
+          <a:xfrm>
+            <a:off x="4095225" y="5255447"/>
+            <a:ext cx="2961314" cy="1057013"/>
+          </a:xfrm>
+          <a:prstGeom prst="flowChartDecision">
+            <a:avLst/>
+          </a:prstGeom>
+        </p:spPr>
+        <p:style>
+          <a:lnRef idx="2">
+            <a:schemeClr val="accent1">
+              <a:shade val="50000"/>
+            </a:schemeClr>
+          </a:lnRef>
+          <a:fillRef idx="1">
+            <a:schemeClr val="accent1"/>
+          </a:fillRef>
+          <a:effectRef idx="0">
+            <a:schemeClr val="accent1"/>
+          </a:effectRef>
+          <a:fontRef idx="minor">
+            <a:schemeClr val="lt1"/>
+          </a:fontRef>
+        </p:style>
+        <p:txBody>
+          <a:bodyPr rtlCol="0" anchor="ctr"/>
+          <a:lstStyle/>
+          <a:p>
+            <a:pPr algn="ctr"/>
+            <a:r>
+              <a:rPr lang="en-GB" dirty="0"/>
+              <a:t>Are there any backlogs?</a:t>
+            </a:r>
+          </a:p>
+        </p:txBody>
+      </p:sp>
+      <p:sp>
+        <p:nvSpPr>
+          <p:cNvPr id="12" name="Arrow: Down 11">
+            <a:extLst>
+              <a:ext uri="{FF2B5EF4-FFF2-40B4-BE49-F238E27FC236}">
+                <a16:creationId xmlns:a16="http://schemas.microsoft.com/office/drawing/2014/main" id="{0FC158B6-7AB0-416E-B7E8-0F0AA57FD2BD}"/>
+              </a:ext>
+            </a:extLst>
+          </p:cNvPr>
+          <p:cNvSpPr/>
+          <p:nvPr/>
+        </p:nvSpPr>
+        <p:spPr>
+          <a:xfrm>
+            <a:off x="8678411" y="2311164"/>
+            <a:ext cx="444616" cy="2093055"/>
+          </a:xfrm>
+          <a:prstGeom prst="downArrow">
+            <a:avLst/>
+          </a:prstGeom>
+        </p:spPr>
+        <p:style>
+          <a:lnRef idx="2">
+            <a:schemeClr val="accent1">
+              <a:shade val="50000"/>
+            </a:schemeClr>
+          </a:lnRef>
+          <a:fillRef idx="1">
+            <a:schemeClr val="accent1"/>
+          </a:fillRef>
+          <a:effectRef idx="0">
+            <a:schemeClr val="accent1"/>
+          </a:effectRef>
+          <a:fontRef idx="minor">
+            <a:schemeClr val="lt1"/>
+          </a:fontRef>
+        </p:style>
+        <p:txBody>
+          <a:bodyPr rtlCol="0" anchor="ctr"/>
+          <a:lstStyle/>
+          <a:p>
+            <a:pPr algn="ctr"/>
+            <a:endParaRPr lang="en-GB"/>
+          </a:p>
+        </p:txBody>
+      </p:sp>
+      <p:sp>
+        <p:nvSpPr>
+          <p:cNvPr id="13" name="Arrow: Left 12">
+            <a:extLst>
+              <a:ext uri="{FF2B5EF4-FFF2-40B4-BE49-F238E27FC236}">
+                <a16:creationId xmlns:a16="http://schemas.microsoft.com/office/drawing/2014/main" id="{F55AD9D8-3756-4B97-AF18-3E998DD5D4E4}"/>
+              </a:ext>
+            </a:extLst>
+          </p:cNvPr>
+          <p:cNvSpPr/>
+          <p:nvPr/>
+        </p:nvSpPr>
+        <p:spPr>
+          <a:xfrm>
+            <a:off x="2709645" y="5681488"/>
+            <a:ext cx="587230" cy="335557"/>
+          </a:xfrm>
+          <a:prstGeom prst="leftArrow">
+            <a:avLst/>
+          </a:prstGeom>
+        </p:spPr>
+        <p:style>
+          <a:lnRef idx="2">
+            <a:schemeClr val="accent1">
+              <a:shade val="50000"/>
+            </a:schemeClr>
+          </a:lnRef>
+          <a:fillRef idx="1">
+            <a:schemeClr val="accent1"/>
+          </a:fillRef>
+          <a:effectRef idx="0">
+            <a:schemeClr val="accent1"/>
+          </a:effectRef>
+          <a:fontRef idx="minor">
+            <a:schemeClr val="lt1"/>
+          </a:fontRef>
+        </p:style>
+        <p:txBody>
+          <a:bodyPr rtlCol="0" anchor="ctr"/>
+          <a:lstStyle/>
+          <a:p>
+            <a:pPr algn="ctr"/>
+            <a:endParaRPr lang="en-GB"/>
+          </a:p>
+        </p:txBody>
+      </p:sp>
+      <p:sp>
+        <p:nvSpPr>
+          <p:cNvPr id="14" name="Arrow: Left 13">
+            <a:extLst>
+              <a:ext uri="{FF2B5EF4-FFF2-40B4-BE49-F238E27FC236}">
+                <a16:creationId xmlns:a16="http://schemas.microsoft.com/office/drawing/2014/main" id="{A3F5FAC0-75D4-46C3-9307-F26F48C4B277}"/>
+              </a:ext>
+            </a:extLst>
+          </p:cNvPr>
+          <p:cNvSpPr/>
+          <p:nvPr/>
+        </p:nvSpPr>
+        <p:spPr>
+          <a:xfrm>
+            <a:off x="7257875" y="5639542"/>
+            <a:ext cx="587230" cy="335557"/>
+          </a:xfrm>
+          <a:prstGeom prst="leftArrow">
+            <a:avLst/>
+          </a:prstGeom>
+        </p:spPr>
+        <p:style>
+          <a:lnRef idx="2">
+            <a:schemeClr val="accent1">
+              <a:shade val="50000"/>
+            </a:schemeClr>
+          </a:lnRef>
+          <a:fillRef idx="1">
+            <a:schemeClr val="accent1"/>
+          </a:fillRef>
+          <a:effectRef idx="0">
+            <a:schemeClr val="accent1"/>
+          </a:effectRef>
+          <a:fontRef idx="minor">
+            <a:schemeClr val="lt1"/>
+          </a:fontRef>
+        </p:style>
+        <p:txBody>
+          <a:bodyPr rtlCol="0" anchor="ctr"/>
+          <a:lstStyle/>
+          <a:p>
+            <a:pPr algn="ctr"/>
+            <a:endParaRPr lang="en-GB"/>
+          </a:p>
+        </p:txBody>
+      </p:sp>
+      <p:sp>
+        <p:nvSpPr>
+          <p:cNvPr id="17" name="TextBox 16">
+            <a:extLst>
+              <a:ext uri="{FF2B5EF4-FFF2-40B4-BE49-F238E27FC236}">
+                <a16:creationId xmlns:a16="http://schemas.microsoft.com/office/drawing/2014/main" id="{B3BAAAA2-1C6D-449B-AA55-740EBE0195C3}"/>
+              </a:ext>
+            </a:extLst>
+          </p:cNvPr>
+          <p:cNvSpPr txBox="1"/>
+          <p:nvPr/>
+        </p:nvSpPr>
+        <p:spPr>
+          <a:xfrm>
+            <a:off x="5341689" y="4708777"/>
+            <a:ext cx="453006" cy="369332"/>
+          </a:xfrm>
+          <a:prstGeom prst="rect">
+            <a:avLst/>
+          </a:prstGeom>
+          <a:noFill/>
+        </p:spPr>
+        <p:txBody>
+          <a:bodyPr wrap="square" rtlCol="0">
+            <a:spAutoFit/>
+          </a:bodyPr>
+          <a:lstStyle/>
+          <a:p>
+            <a:r>
+              <a:rPr lang="en-GB" dirty="0"/>
+              <a:t>No</a:t>
+            </a:r>
+          </a:p>
+        </p:txBody>
+      </p:sp>
+      <p:sp>
+        <p:nvSpPr>
+          <p:cNvPr id="18" name="TextBox 17">
+            <a:extLst>
+              <a:ext uri="{FF2B5EF4-FFF2-40B4-BE49-F238E27FC236}">
+                <a16:creationId xmlns:a16="http://schemas.microsoft.com/office/drawing/2014/main" id="{2F4585BF-F7F6-4581-99FC-16D9F6B3254A}"/>
+              </a:ext>
+            </a:extLst>
+          </p:cNvPr>
+          <p:cNvSpPr txBox="1"/>
+          <p:nvPr/>
+        </p:nvSpPr>
+        <p:spPr>
+          <a:xfrm>
+            <a:off x="3495414" y="5647713"/>
+            <a:ext cx="599811" cy="369332"/>
+          </a:xfrm>
+          <a:prstGeom prst="rect">
+            <a:avLst/>
+          </a:prstGeom>
+          <a:noFill/>
+        </p:spPr>
+        <p:txBody>
+          <a:bodyPr wrap="square" rtlCol="0">
+            <a:spAutoFit/>
+          </a:bodyPr>
+          <a:lstStyle/>
+          <a:p>
+            <a:r>
+              <a:rPr lang="en-GB" dirty="0"/>
+              <a:t>Yes</a:t>
+            </a:r>
+          </a:p>
+        </p:txBody>
+      </p:sp>
+      <p:sp>
+        <p:nvSpPr>
+          <p:cNvPr id="21" name="Flowchart: Process 20">
+            <a:extLst>
+              <a:ext uri="{FF2B5EF4-FFF2-40B4-BE49-F238E27FC236}">
+                <a16:creationId xmlns:a16="http://schemas.microsoft.com/office/drawing/2014/main" id="{6522779B-108A-4A59-8236-756F6EC133A4}"/>
+              </a:ext>
+            </a:extLst>
+          </p:cNvPr>
+          <p:cNvSpPr/>
+          <p:nvPr/>
+        </p:nvSpPr>
+        <p:spPr>
+          <a:xfrm>
+            <a:off x="327171" y="2483838"/>
+            <a:ext cx="5768829" cy="494951"/>
+          </a:xfrm>
+          <a:prstGeom prst="flowChartProcess">
+            <a:avLst/>
+          </a:prstGeom>
+        </p:spPr>
+        <p:style>
+          <a:lnRef idx="2">
+            <a:schemeClr val="accent1">
+              <a:shade val="50000"/>
+            </a:schemeClr>
+          </a:lnRef>
+          <a:fillRef idx="1">
+            <a:schemeClr val="accent1"/>
+          </a:fillRef>
+          <a:effectRef idx="0">
+            <a:schemeClr val="accent1"/>
+          </a:effectRef>
+          <a:fontRef idx="minor">
+            <a:schemeClr val="lt1"/>
+          </a:fontRef>
+        </p:style>
+        <p:txBody>
+          <a:bodyPr rtlCol="0" anchor="ctr"/>
+          <a:lstStyle/>
+          <a:p>
+            <a:pPr algn="ctr"/>
+            <a:r>
+              <a:rPr lang="en-GB" dirty="0"/>
+              <a:t>Wait for a short delay </a:t>
+            </a:r>
+          </a:p>
+        </p:txBody>
+      </p:sp>
+      <p:sp>
+        <p:nvSpPr>
+          <p:cNvPr id="22" name="Arrow: Up 21">
+            <a:extLst>
+              <a:ext uri="{FF2B5EF4-FFF2-40B4-BE49-F238E27FC236}">
+                <a16:creationId xmlns:a16="http://schemas.microsoft.com/office/drawing/2014/main" id="{EA32E0BF-8702-4679-BD94-9FEDE1FA44C9}"/>
+              </a:ext>
+            </a:extLst>
+          </p:cNvPr>
+          <p:cNvSpPr/>
+          <p:nvPr/>
+        </p:nvSpPr>
+        <p:spPr>
+          <a:xfrm>
+            <a:off x="4302153" y="1547656"/>
+            <a:ext cx="453006" cy="763508"/>
+          </a:xfrm>
+          <a:prstGeom prst="upArrow">
+            <a:avLst/>
+          </a:prstGeom>
+        </p:spPr>
+        <p:style>
+          <a:lnRef idx="2">
+            <a:schemeClr val="accent1">
+              <a:shade val="50000"/>
+            </a:schemeClr>
+          </a:lnRef>
+          <a:fillRef idx="1">
+            <a:schemeClr val="accent1"/>
+          </a:fillRef>
+          <a:effectRef idx="0">
+            <a:schemeClr val="accent1"/>
+          </a:effectRef>
+          <a:fontRef idx="minor">
+            <a:schemeClr val="lt1"/>
+          </a:fontRef>
+        </p:style>
+        <p:txBody>
+          <a:bodyPr rtlCol="0" anchor="ctr"/>
+          <a:lstStyle/>
+          <a:p>
+            <a:pPr algn="ctr"/>
+            <a:endParaRPr lang="en-GB" dirty="0"/>
+          </a:p>
+        </p:txBody>
+      </p:sp>
+      <p:sp>
+        <p:nvSpPr>
+          <p:cNvPr id="23" name="Arrow: Up 22">
+            <a:extLst>
+              <a:ext uri="{FF2B5EF4-FFF2-40B4-BE49-F238E27FC236}">
+                <a16:creationId xmlns:a16="http://schemas.microsoft.com/office/drawing/2014/main" id="{57B770F4-12E0-42EA-9DDA-DF9561C208A0}"/>
+              </a:ext>
+            </a:extLst>
+          </p:cNvPr>
+          <p:cNvSpPr/>
+          <p:nvPr/>
+        </p:nvSpPr>
+        <p:spPr>
+          <a:xfrm>
+            <a:off x="1091965" y="3294775"/>
+            <a:ext cx="453006" cy="494951"/>
+          </a:xfrm>
+          <a:prstGeom prst="upArrow">
+            <a:avLst/>
+          </a:prstGeom>
+        </p:spPr>
+        <p:style>
+          <a:lnRef idx="2">
+            <a:schemeClr val="accent1">
+              <a:shade val="50000"/>
+            </a:schemeClr>
+          </a:lnRef>
+          <a:fillRef idx="1">
+            <a:schemeClr val="accent1"/>
+          </a:fillRef>
+          <a:effectRef idx="0">
+            <a:schemeClr val="accent1"/>
+          </a:effectRef>
+          <a:fontRef idx="minor">
+            <a:schemeClr val="lt1"/>
+          </a:fontRef>
+        </p:style>
+        <p:txBody>
+          <a:bodyPr rtlCol="0" anchor="ctr"/>
+          <a:lstStyle/>
+          <a:p>
+            <a:pPr algn="ctr"/>
+            <a:endParaRPr lang="en-GB" dirty="0"/>
+          </a:p>
+        </p:txBody>
+      </p:sp>
+      <p:sp>
+        <p:nvSpPr>
+          <p:cNvPr id="25" name="Flowchart: Process 24">
+            <a:extLst>
+              <a:ext uri="{FF2B5EF4-FFF2-40B4-BE49-F238E27FC236}">
+                <a16:creationId xmlns:a16="http://schemas.microsoft.com/office/drawing/2014/main" id="{F644BBE3-6F8E-4939-A2D5-00B538FC4AA8}"/>
+              </a:ext>
+            </a:extLst>
+          </p:cNvPr>
+          <p:cNvSpPr/>
+          <p:nvPr/>
+        </p:nvSpPr>
+        <p:spPr>
+          <a:xfrm>
+            <a:off x="327171" y="4083195"/>
+            <a:ext cx="2130803" cy="494951"/>
+          </a:xfrm>
+          <a:prstGeom prst="flowChartProcess">
+            <a:avLst/>
+          </a:prstGeom>
+        </p:spPr>
+        <p:style>
+          <a:lnRef idx="2">
+            <a:schemeClr val="accent1">
+              <a:shade val="50000"/>
+            </a:schemeClr>
+          </a:lnRef>
+          <a:fillRef idx="1">
+            <a:schemeClr val="accent1"/>
+          </a:fillRef>
+          <a:effectRef idx="0">
+            <a:schemeClr val="accent1"/>
+          </a:effectRef>
+          <a:fontRef idx="minor">
+            <a:schemeClr val="lt1"/>
+          </a:fontRef>
+        </p:style>
+        <p:txBody>
+          <a:bodyPr rtlCol="0" anchor="ctr"/>
+          <a:lstStyle/>
+          <a:p>
+            <a:pPr algn="ctr"/>
+            <a:r>
+              <a:rPr lang="en-GB" dirty="0"/>
+              <a:t>Save report to repository</a:t>
+            </a:r>
+          </a:p>
+        </p:txBody>
+      </p:sp>
+      <p:sp>
+        <p:nvSpPr>
+          <p:cNvPr id="26" name="Arrow: Up 25">
+            <a:extLst>
+              <a:ext uri="{FF2B5EF4-FFF2-40B4-BE49-F238E27FC236}">
+                <a16:creationId xmlns:a16="http://schemas.microsoft.com/office/drawing/2014/main" id="{2CA03E46-FBCC-4218-BE3B-ABA29F55E721}"/>
+              </a:ext>
+            </a:extLst>
+          </p:cNvPr>
+          <p:cNvSpPr/>
+          <p:nvPr/>
+        </p:nvSpPr>
+        <p:spPr>
+          <a:xfrm>
+            <a:off x="1097443" y="4856347"/>
+            <a:ext cx="453006" cy="494951"/>
+          </a:xfrm>
+          <a:prstGeom prst="upArrow">
+            <a:avLst/>
+          </a:prstGeom>
+        </p:spPr>
+        <p:style>
+          <a:lnRef idx="2">
+            <a:schemeClr val="accent1">
+              <a:shade val="50000"/>
+            </a:schemeClr>
+          </a:lnRef>
+          <a:fillRef idx="1">
+            <a:schemeClr val="accent1"/>
+          </a:fillRef>
+          <a:effectRef idx="0">
+            <a:schemeClr val="accent1"/>
+          </a:effectRef>
+          <a:fontRef idx="minor">
+            <a:schemeClr val="lt1"/>
+          </a:fontRef>
+        </p:style>
+        <p:txBody>
+          <a:bodyPr rtlCol="0" anchor="ctr"/>
+          <a:lstStyle/>
+          <a:p>
+            <a:pPr algn="ctr"/>
+            <a:endParaRPr lang="en-GB" dirty="0"/>
+          </a:p>
+        </p:txBody>
+      </p:sp>
+      <p:sp>
+        <p:nvSpPr>
+          <p:cNvPr id="27" name="Flowchart: Magnetic Disk 26">
+            <a:extLst>
+              <a:ext uri="{FF2B5EF4-FFF2-40B4-BE49-F238E27FC236}">
+                <a16:creationId xmlns:a16="http://schemas.microsoft.com/office/drawing/2014/main" id="{4DCFDDD2-BF4D-4F15-BF68-9C83E67CEAFB}"/>
+              </a:ext>
+            </a:extLst>
+          </p:cNvPr>
+          <p:cNvSpPr/>
+          <p:nvPr/>
+        </p:nvSpPr>
+        <p:spPr>
+          <a:xfrm>
+            <a:off x="10916816" y="813732"/>
+            <a:ext cx="438539" cy="494951"/>
+          </a:xfrm>
+          <a:prstGeom prst="flowChartMagneticDisk">
+            <a:avLst/>
+          </a:prstGeom>
+        </p:spPr>
+        <p:style>
+          <a:lnRef idx="2">
+            <a:schemeClr val="accent4">
+              <a:shade val="50000"/>
+            </a:schemeClr>
+          </a:lnRef>
+          <a:fillRef idx="1">
+            <a:schemeClr val="accent4"/>
+          </a:fillRef>
+          <a:effectRef idx="0">
+            <a:schemeClr val="accent4"/>
+          </a:effectRef>
+          <a:fontRef idx="minor">
+            <a:schemeClr val="lt1"/>
+          </a:fontRef>
+        </p:style>
+        <p:txBody>
+          <a:bodyPr rtlCol="0" anchor="ctr"/>
+          <a:lstStyle/>
+          <a:p>
+            <a:pPr algn="ctr"/>
+            <a:endParaRPr lang="en-GB"/>
+          </a:p>
+        </p:txBody>
+      </p:sp>
+      <p:sp>
+        <p:nvSpPr>
+          <p:cNvPr id="28" name="Flowchart: Magnetic Disk 27">
+            <a:extLst>
+              <a:ext uri="{FF2B5EF4-FFF2-40B4-BE49-F238E27FC236}">
+                <a16:creationId xmlns:a16="http://schemas.microsoft.com/office/drawing/2014/main" id="{5763C8D1-B94E-4907-AE63-E49EDCDF8840}"/>
+              </a:ext>
+            </a:extLst>
+          </p:cNvPr>
+          <p:cNvSpPr/>
+          <p:nvPr/>
+        </p:nvSpPr>
+        <p:spPr>
+          <a:xfrm>
+            <a:off x="2709645" y="4073849"/>
+            <a:ext cx="438539" cy="494951"/>
+          </a:xfrm>
+          <a:prstGeom prst="flowChartMagneticDisk">
+            <a:avLst/>
+          </a:prstGeom>
+        </p:spPr>
+        <p:style>
+          <a:lnRef idx="2">
+            <a:schemeClr val="accent4">
+              <a:shade val="50000"/>
+            </a:schemeClr>
+          </a:lnRef>
+          <a:fillRef idx="1">
+            <a:schemeClr val="accent4"/>
+          </a:fillRef>
+          <a:effectRef idx="0">
+            <a:schemeClr val="accent4"/>
+          </a:effectRef>
+          <a:fontRef idx="minor">
+            <a:schemeClr val="lt1"/>
+          </a:fontRef>
+        </p:style>
+        <p:txBody>
+          <a:bodyPr rtlCol="0" anchor="ctr"/>
+          <a:lstStyle/>
+          <a:p>
+            <a:pPr algn="ctr"/>
+            <a:endParaRPr lang="en-GB"/>
+          </a:p>
+        </p:txBody>
+      </p:sp>
+    </p:spTree>
+    <p:extLst>
+      <p:ext uri="{BB962C8B-B14F-4D97-AF65-F5344CB8AC3E}">
+        <p14:creationId xmlns:p14="http://schemas.microsoft.com/office/powerpoint/2010/main" val="3504209056"/>
+      </p:ext>
+    </p:extLst>
+  </p:cSld>
+  <p:clrMapOvr>
+    <a:masterClrMapping/>
+  </p:clrMapOvr>
+</p:sld>
+</file>
+
 <file path=ppt/theme/theme1.xml><?xml version="1.0" encoding="utf-8"?>
 <a:theme xmlns:a="http://schemas.openxmlformats.org/drawingml/2006/main" name="Office Theme">
   <a:themeElements>

</xml_diff>